<commit_message>
Lesson 13 21 Nov 2024
</commit_message>
<xml_diff>
--- a/DSA-013-Deep_Learning_4/DSA_Deep_Learning_[4]_Theory.pptx
+++ b/DSA-013-Deep_Learning_4/DSA_Deep_Learning_[4]_Theory.pptx
@@ -1642,7 +1642,7 @@
         </p:nvSpPr>
         <p:spPr>
           <a:xfrm>
-            <a:off x="381300" y="685800"/>
+            <a:off x="381000" y="685800"/>
             <a:ext cx="6096000" cy="3429000"/>
           </a:xfrm>
           <a:custGeom>
@@ -1705,6 +1705,14 @@
               </a:spcAft>
               <a:buNone/>
             </a:pPr>
+            <a:r>
+              <a:rPr lang="en-SG" dirty="0"/>
+              <a:t>DQN Learning – deep </a:t>
+            </a:r>
+            <a:r>
+              <a:rPr lang="en-SG"/>
+              <a:t>q-network learning</a:t>
+            </a:r>
             <a:endParaRPr/>
           </a:p>
         </p:txBody>

</xml_diff>